<commit_message>
changes for East midlands data group 09/05/2024
</commit_message>
<xml_diff>
--- a/DbaFundamentalsPartitioning/Partitions.pptx
+++ b/DbaFundamentalsPartitioning/Partitions.pptx
@@ -5,26 +5,27 @@
     <p:sldMasterId id="2147483648" r:id="rId1"/>
   </p:sldMasterIdLst>
   <p:notesMasterIdLst>
-    <p:notesMasterId r:id="rId19"/>
+    <p:notesMasterId r:id="rId20"/>
   </p:notesMasterIdLst>
   <p:sldIdLst>
     <p:sldId id="256" r:id="rId2"/>
     <p:sldId id="267" r:id="rId3"/>
-    <p:sldId id="268" r:id="rId4"/>
-    <p:sldId id="260" r:id="rId5"/>
-    <p:sldId id="261" r:id="rId6"/>
-    <p:sldId id="262" r:id="rId7"/>
-    <p:sldId id="258" r:id="rId8"/>
-    <p:sldId id="257" r:id="rId9"/>
-    <p:sldId id="264" r:id="rId10"/>
-    <p:sldId id="272" r:id="rId11"/>
-    <p:sldId id="263" r:id="rId12"/>
-    <p:sldId id="265" r:id="rId13"/>
-    <p:sldId id="266" r:id="rId14"/>
-    <p:sldId id="271" r:id="rId15"/>
-    <p:sldId id="269" r:id="rId16"/>
-    <p:sldId id="270" r:id="rId17"/>
-    <p:sldId id="273" r:id="rId18"/>
+    <p:sldId id="274" r:id="rId4"/>
+    <p:sldId id="268" r:id="rId5"/>
+    <p:sldId id="260" r:id="rId6"/>
+    <p:sldId id="261" r:id="rId7"/>
+    <p:sldId id="262" r:id="rId8"/>
+    <p:sldId id="258" r:id="rId9"/>
+    <p:sldId id="257" r:id="rId10"/>
+    <p:sldId id="264" r:id="rId11"/>
+    <p:sldId id="272" r:id="rId12"/>
+    <p:sldId id="263" r:id="rId13"/>
+    <p:sldId id="265" r:id="rId14"/>
+    <p:sldId id="266" r:id="rId15"/>
+    <p:sldId id="271" r:id="rId16"/>
+    <p:sldId id="269" r:id="rId17"/>
+    <p:sldId id="270" r:id="rId18"/>
+    <p:sldId id="273" r:id="rId19"/>
   </p:sldIdLst>
   <p:sldSz cx="12192000" cy="6858000"/>
   <p:notesSz cx="6858000" cy="9144000"/>
@@ -123,6 +124,11 @@
       </a:defRPr>
     </a:lvl9pPr>
   </p:defaultTextStyle>
+  <p:extLst>
+    <p:ext uri="{EFAFB233-063F-42B5-8137-9DF3F51BA10A}">
+      <p15:sldGuideLst xmlns:p15="http://schemas.microsoft.com/office/powerpoint/2012/main"/>
+    </p:ext>
+  </p:extLst>
 </p:presentation>
 </file>
 
@@ -216,7 +222,7 @@
           <a:p>
             <a:fld id="{BC0CB557-5DAC-BB40-B5C4-02173892A5EB}" type="datetimeFigureOut">
               <a:rPr lang="en-US" smtClean="0"/>
-              <a:t>7/24/23</a:t>
+              <a:t>5/8/24</a:t>
             </a:fld>
             <a:endParaRPr lang="en-US"/>
           </a:p>
@@ -548,7 +554,7 @@
           <a:p>
             <a:fld id="{C3B9EF61-6F06-D942-A422-83A5CFAC0A04}" type="slidenum">
               <a:rPr lang="en-US" smtClean="0"/>
-              <a:t>8</a:t>
+              <a:t>9</a:t>
             </a:fld>
             <a:endParaRPr lang="en-US"/>
           </a:p>
@@ -632,7 +638,7 @@
           <a:p>
             <a:fld id="{C3B9EF61-6F06-D942-A422-83A5CFAC0A04}" type="slidenum">
               <a:rPr lang="en-US" smtClean="0"/>
-              <a:t>15</a:t>
+              <a:t>16</a:t>
             </a:fld>
             <a:endParaRPr lang="en-US"/>
           </a:p>
@@ -798,7 +804,7 @@
           <a:p>
             <a:fld id="{187F636C-A129-F447-895A-3A9C42C1F0C9}" type="datetimeFigureOut">
               <a:rPr lang="en-US" smtClean="0"/>
-              <a:t>7/23/23</a:t>
+              <a:t>5/8/24</a:t>
             </a:fld>
             <a:endParaRPr lang="en-US"/>
           </a:p>
@@ -996,7 +1002,7 @@
           <a:p>
             <a:fld id="{187F636C-A129-F447-895A-3A9C42C1F0C9}" type="datetimeFigureOut">
               <a:rPr lang="en-US" smtClean="0"/>
-              <a:t>7/23/23</a:t>
+              <a:t>5/8/24</a:t>
             </a:fld>
             <a:endParaRPr lang="en-US"/>
           </a:p>
@@ -1204,7 +1210,7 @@
           <a:p>
             <a:fld id="{187F636C-A129-F447-895A-3A9C42C1F0C9}" type="datetimeFigureOut">
               <a:rPr lang="en-US" smtClean="0"/>
-              <a:t>7/23/23</a:t>
+              <a:t>5/8/24</a:t>
             </a:fld>
             <a:endParaRPr lang="en-US"/>
           </a:p>
@@ -1402,7 +1408,7 @@
           <a:p>
             <a:fld id="{187F636C-A129-F447-895A-3A9C42C1F0C9}" type="datetimeFigureOut">
               <a:rPr lang="en-US" smtClean="0"/>
-              <a:t>7/23/23</a:t>
+              <a:t>5/8/24</a:t>
             </a:fld>
             <a:endParaRPr lang="en-US"/>
           </a:p>
@@ -1677,7 +1683,7 @@
           <a:p>
             <a:fld id="{187F636C-A129-F447-895A-3A9C42C1F0C9}" type="datetimeFigureOut">
               <a:rPr lang="en-US" smtClean="0"/>
-              <a:t>7/23/23</a:t>
+              <a:t>5/8/24</a:t>
             </a:fld>
             <a:endParaRPr lang="en-US"/>
           </a:p>
@@ -1942,7 +1948,7 @@
           <a:p>
             <a:fld id="{187F636C-A129-F447-895A-3A9C42C1F0C9}" type="datetimeFigureOut">
               <a:rPr lang="en-US" smtClean="0"/>
-              <a:t>7/23/23</a:t>
+              <a:t>5/8/24</a:t>
             </a:fld>
             <a:endParaRPr lang="en-US"/>
           </a:p>
@@ -2354,7 +2360,7 @@
           <a:p>
             <a:fld id="{187F636C-A129-F447-895A-3A9C42C1F0C9}" type="datetimeFigureOut">
               <a:rPr lang="en-US" smtClean="0"/>
-              <a:t>7/23/23</a:t>
+              <a:t>5/8/24</a:t>
             </a:fld>
             <a:endParaRPr lang="en-US"/>
           </a:p>
@@ -2495,7 +2501,7 @@
           <a:p>
             <a:fld id="{187F636C-A129-F447-895A-3A9C42C1F0C9}" type="datetimeFigureOut">
               <a:rPr lang="en-US" smtClean="0"/>
-              <a:t>7/23/23</a:t>
+              <a:t>5/8/24</a:t>
             </a:fld>
             <a:endParaRPr lang="en-US"/>
           </a:p>
@@ -2608,7 +2614,7 @@
           <a:p>
             <a:fld id="{187F636C-A129-F447-895A-3A9C42C1F0C9}" type="datetimeFigureOut">
               <a:rPr lang="en-US" smtClean="0"/>
-              <a:t>7/23/23</a:t>
+              <a:t>5/8/24</a:t>
             </a:fld>
             <a:endParaRPr lang="en-US"/>
           </a:p>
@@ -2919,7 +2925,7 @@
           <a:p>
             <a:fld id="{187F636C-A129-F447-895A-3A9C42C1F0C9}" type="datetimeFigureOut">
               <a:rPr lang="en-US" smtClean="0"/>
-              <a:t>7/23/23</a:t>
+              <a:t>5/8/24</a:t>
             </a:fld>
             <a:endParaRPr lang="en-US"/>
           </a:p>
@@ -3207,7 +3213,7 @@
           <a:p>
             <a:fld id="{187F636C-A129-F447-895A-3A9C42C1F0C9}" type="datetimeFigureOut">
               <a:rPr lang="en-US" smtClean="0"/>
-              <a:t>7/23/23</a:t>
+              <a:t>5/8/24</a:t>
             </a:fld>
             <a:endParaRPr lang="en-US"/>
           </a:p>
@@ -3448,7 +3454,7 @@
           <a:p>
             <a:fld id="{187F636C-A129-F447-895A-3A9C42C1F0C9}" type="datetimeFigureOut">
               <a:rPr lang="en-US" smtClean="0"/>
-              <a:t>7/23/23</a:t>
+              <a:t>5/8/24</a:t>
             </a:fld>
             <a:endParaRPr lang="en-US"/>
           </a:p>
@@ -11020,6 +11026,135 @@
           <p:cNvPr id="2" name="Title 1">
             <a:extLst>
               <a:ext uri="{FF2B5EF4-FFF2-40B4-BE49-F238E27FC236}">
+                <a16:creationId xmlns:a16="http://schemas.microsoft.com/office/drawing/2014/main" id="{5F363C9A-E2EA-EA57-35C8-E4516C9C5BF3}"/>
+              </a:ext>
+            </a:extLst>
+          </p:cNvPr>
+          <p:cNvSpPr>
+            <a:spLocks noGrp="1"/>
+          </p:cNvSpPr>
+          <p:nvPr>
+            <p:ph type="title"/>
+          </p:nvPr>
+        </p:nvSpPr>
+        <p:spPr/>
+        <p:txBody>
+          <a:bodyPr/>
+          <a:lstStyle/>
+          <a:p>
+            <a:r>
+              <a:rPr lang="en-US" dirty="0"/>
+              <a:t>Partition Functions (2)</a:t>
+            </a:r>
+          </a:p>
+        </p:txBody>
+      </p:sp>
+      <p:sp>
+        <p:nvSpPr>
+          <p:cNvPr id="3" name="Content Placeholder 2">
+            <a:extLst>
+              <a:ext uri="{FF2B5EF4-FFF2-40B4-BE49-F238E27FC236}">
+                <a16:creationId xmlns:a16="http://schemas.microsoft.com/office/drawing/2014/main" id="{D5780808-EDFC-D563-CB25-280150662DEF}"/>
+              </a:ext>
+            </a:extLst>
+          </p:cNvPr>
+          <p:cNvSpPr>
+            <a:spLocks noGrp="1"/>
+          </p:cNvSpPr>
+          <p:nvPr>
+            <p:ph idx="1"/>
+          </p:nvPr>
+        </p:nvSpPr>
+        <p:spPr/>
+        <p:txBody>
+          <a:bodyPr/>
+          <a:lstStyle/>
+          <a:p>
+            <a:r>
+              <a:rPr lang="en-US" dirty="0"/>
+              <a:t>Partition Functions are not easy to alter</a:t>
+            </a:r>
+          </a:p>
+          <a:p>
+            <a:r>
+              <a:rPr lang="en-US" dirty="0"/>
+              <a:t>A partition for anything to the left of your initial boundary will be created.</a:t>
+            </a:r>
+          </a:p>
+          <a:p>
+            <a:r>
+              <a:rPr lang="en-US" dirty="0"/>
+              <a:t>Think about the lifecycle of your data and the partitioning. </a:t>
+            </a:r>
+          </a:p>
+          <a:p>
+            <a:pPr lvl="1"/>
+            <a:r>
+              <a:rPr lang="en-US" dirty="0"/>
+              <a:t>Create more partitions for the future, maybe 3-5 years?</a:t>
+            </a:r>
+          </a:p>
+          <a:p>
+            <a:pPr lvl="1"/>
+            <a:r>
+              <a:rPr lang="en-US" dirty="0"/>
+              <a:t>Create them programmatically for really long periods </a:t>
+            </a:r>
+          </a:p>
+          <a:p>
+            <a:r>
+              <a:rPr lang="en-US" dirty="0"/>
+              <a:t>Can be applied to more that one table.</a:t>
+            </a:r>
+          </a:p>
+          <a:p>
+            <a:pPr lvl="1"/>
+            <a:r>
+              <a:rPr lang="en-US" dirty="0"/>
+              <a:t>Partition HR and Finance data on the same boundaries?</a:t>
+            </a:r>
+          </a:p>
+          <a:p>
+            <a:pPr lvl="1"/>
+            <a:endParaRPr lang="en-US" dirty="0"/>
+          </a:p>
+        </p:txBody>
+      </p:sp>
+    </p:spTree>
+    <p:extLst>
+      <p:ext uri="{BB962C8B-B14F-4D97-AF65-F5344CB8AC3E}">
+        <p14:creationId xmlns:p14="http://schemas.microsoft.com/office/powerpoint/2010/main" val="3316607413"/>
+      </p:ext>
+    </p:extLst>
+  </p:cSld>
+  <p:clrMapOvr>
+    <a:masterClrMapping/>
+  </p:clrMapOvr>
+</p:sld>
+</file>
+
+<file path=ppt/slides/slide11.xml><?xml version="1.0" encoding="utf-8"?>
+<p:sld xmlns:a="http://schemas.openxmlformats.org/drawingml/2006/main" xmlns:r="http://schemas.openxmlformats.org/officeDocument/2006/relationships" xmlns:p="http://schemas.openxmlformats.org/presentationml/2006/main">
+  <p:cSld>
+    <p:spTree>
+      <p:nvGrpSpPr>
+        <p:cNvPr id="1" name=""/>
+        <p:cNvGrpSpPr/>
+        <p:nvPr/>
+      </p:nvGrpSpPr>
+      <p:grpSpPr>
+        <a:xfrm>
+          <a:off x="0" y="0"/>
+          <a:ext cx="0" cy="0"/>
+          <a:chOff x="0" y="0"/>
+          <a:chExt cx="0" cy="0"/>
+        </a:xfrm>
+      </p:grpSpPr>
+      <p:sp>
+        <p:nvSpPr>
+          <p:cNvPr id="2" name="Title 1">
+            <a:extLst>
+              <a:ext uri="{FF2B5EF4-FFF2-40B4-BE49-F238E27FC236}">
                 <a16:creationId xmlns:a16="http://schemas.microsoft.com/office/drawing/2014/main" id="{980552CA-2695-1A0B-5D98-8D0656ABBD59}"/>
               </a:ext>
             </a:extLst>
@@ -11120,7 +11255,7 @@
 </p:sld>
 </file>
 
-<file path=ppt/slides/slide11.xml><?xml version="1.0" encoding="utf-8"?>
+<file path=ppt/slides/slide12.xml><?xml version="1.0" encoding="utf-8"?>
 <p:sld xmlns:a="http://schemas.openxmlformats.org/drawingml/2006/main" xmlns:r="http://schemas.openxmlformats.org/officeDocument/2006/relationships" xmlns:p="http://schemas.openxmlformats.org/presentationml/2006/main">
   <p:cSld>
     <p:spTree>
@@ -11260,7 +11395,7 @@
 </p:sld>
 </file>
 
-<file path=ppt/slides/slide12.xml><?xml version="1.0" encoding="utf-8"?>
+<file path=ppt/slides/slide13.xml><?xml version="1.0" encoding="utf-8"?>
 <p:sld xmlns:a="http://schemas.openxmlformats.org/drawingml/2006/main" xmlns:r="http://schemas.openxmlformats.org/officeDocument/2006/relationships" xmlns:p="http://schemas.openxmlformats.org/presentationml/2006/main">
   <p:cSld>
     <p:spTree>
@@ -11382,7 +11517,7 @@
 </p:sld>
 </file>
 
-<file path=ppt/slides/slide13.xml><?xml version="1.0" encoding="utf-8"?>
+<file path=ppt/slides/slide14.xml><?xml version="1.0" encoding="utf-8"?>
 <p:sld xmlns:a="http://schemas.openxmlformats.org/drawingml/2006/main" xmlns:r="http://schemas.openxmlformats.org/officeDocument/2006/relationships" xmlns:p="http://schemas.openxmlformats.org/presentationml/2006/main">
   <p:cSld>
     <p:spTree>
@@ -11486,7 +11621,7 @@
 </p:sld>
 </file>
 
-<file path=ppt/slides/slide14.xml><?xml version="1.0" encoding="utf-8"?>
+<file path=ppt/slides/slide15.xml><?xml version="1.0" encoding="utf-8"?>
 <p:sld xmlns:a="http://schemas.openxmlformats.org/drawingml/2006/main" xmlns:r="http://schemas.openxmlformats.org/officeDocument/2006/relationships" xmlns:p="http://schemas.openxmlformats.org/presentationml/2006/main">
   <p:cSld>
     <p:spTree>
@@ -11572,7 +11707,7 @@
 </p:sld>
 </file>
 
-<file path=ppt/slides/slide15.xml><?xml version="1.0" encoding="utf-8"?>
+<file path=ppt/slides/slide16.xml><?xml version="1.0" encoding="utf-8"?>
 <p:sld xmlns:a="http://schemas.openxmlformats.org/drawingml/2006/main" xmlns:r="http://schemas.openxmlformats.org/officeDocument/2006/relationships" xmlns:p="http://schemas.openxmlformats.org/presentationml/2006/main">
   <p:cSld>
     <p:spTree>
@@ -11658,7 +11793,7 @@
 </p:sld>
 </file>
 
-<file path=ppt/slides/slide16.xml><?xml version="1.0" encoding="utf-8"?>
+<file path=ppt/slides/slide17.xml><?xml version="1.0" encoding="utf-8"?>
 <p:sld xmlns:a="http://schemas.openxmlformats.org/drawingml/2006/main" xmlns:r="http://schemas.openxmlformats.org/officeDocument/2006/relationships" xmlns:p="http://schemas.openxmlformats.org/presentationml/2006/main">
   <p:cSld>
     <p:spTree>
@@ -11779,7 +11914,7 @@
 </p:sld>
 </file>
 
-<file path=ppt/slides/slide17.xml><?xml version="1.0" encoding="utf-8"?>
+<file path=ppt/slides/slide18.xml><?xml version="1.0" encoding="utf-8"?>
 <p:sld xmlns:a="http://schemas.openxmlformats.org/drawingml/2006/main" xmlns:r="http://schemas.openxmlformats.org/officeDocument/2006/relationships" xmlns:p="http://schemas.openxmlformats.org/presentationml/2006/main">
   <p:cSld>
     <p:spTree>
@@ -12050,6 +12185,457 @@
           <a:chExt cx="0" cy="0"/>
         </a:xfrm>
       </p:grpSpPr>
+      <p:pic>
+        <p:nvPicPr>
+          <p:cNvPr id="4" name="Picture 3" descr="A map of united kingdom with stars&#10;&#10;Description automatically generated">
+            <a:extLst>
+              <a:ext uri="{FF2B5EF4-FFF2-40B4-BE49-F238E27FC236}">
+                <a16:creationId xmlns:a16="http://schemas.microsoft.com/office/drawing/2014/main" id="{FB366760-C2F4-1B6B-32B6-2D4A4496875F}"/>
+              </a:ext>
+            </a:extLst>
+          </p:cNvPr>
+          <p:cNvPicPr>
+            <a:picLocks noChangeAspect="1"/>
+          </p:cNvPicPr>
+          <p:nvPr/>
+        </p:nvPicPr>
+        <p:blipFill>
+          <a:blip r:embed="rId2">
+            <a:extLst>
+              <a:ext uri="{28A0092B-C50C-407E-A947-70E740481C1C}">
+                <a14:useLocalDpi xmlns:a14="http://schemas.microsoft.com/office/drawing/2010/main" val="0"/>
+              </a:ext>
+            </a:extLst>
+          </a:blip>
+          <a:stretch>
+            <a:fillRect/>
+          </a:stretch>
+        </p:blipFill>
+        <p:spPr>
+          <a:xfrm>
+            <a:off x="473331" y="289992"/>
+            <a:ext cx="3695238" cy="6361905"/>
+          </a:xfrm>
+          <a:prstGeom prst="rect">
+            <a:avLst/>
+          </a:prstGeom>
+        </p:spPr>
+      </p:pic>
+      <p:pic>
+        <p:nvPicPr>
+          <p:cNvPr id="5" name="Picture 4">
+            <a:extLst>
+              <a:ext uri="{FF2B5EF4-FFF2-40B4-BE49-F238E27FC236}">
+                <a16:creationId xmlns:a16="http://schemas.microsoft.com/office/drawing/2014/main" id="{489BDC49-7DC7-2185-7A6A-5E69F7061179}"/>
+              </a:ext>
+            </a:extLst>
+          </p:cNvPr>
+          <p:cNvPicPr>
+            <a:picLocks noChangeAspect="1"/>
+          </p:cNvPicPr>
+          <p:nvPr/>
+        </p:nvPicPr>
+        <p:blipFill>
+          <a:blip r:embed="rId3"/>
+          <a:stretch>
+            <a:fillRect/>
+          </a:stretch>
+        </p:blipFill>
+        <p:spPr>
+          <a:xfrm>
+            <a:off x="4375052" y="4311841"/>
+            <a:ext cx="7521525" cy="2275261"/>
+          </a:xfrm>
+          <a:prstGeom prst="rect">
+            <a:avLst/>
+          </a:prstGeom>
+        </p:spPr>
+      </p:pic>
+      <p:sp>
+        <p:nvSpPr>
+          <p:cNvPr id="6" name="TextBox 5">
+            <a:extLst>
+              <a:ext uri="{FF2B5EF4-FFF2-40B4-BE49-F238E27FC236}">
+                <a16:creationId xmlns:a16="http://schemas.microsoft.com/office/drawing/2014/main" id="{B96FA44F-5851-9C8E-7982-23F1E8B5A485}"/>
+              </a:ext>
+            </a:extLst>
+          </p:cNvPr>
+          <p:cNvSpPr txBox="1"/>
+          <p:nvPr/>
+        </p:nvSpPr>
+        <p:spPr>
+          <a:xfrm>
+            <a:off x="3593174" y="1110245"/>
+            <a:ext cx="4252112" cy="1815882"/>
+          </a:xfrm>
+          <a:prstGeom prst="rect">
+            <a:avLst/>
+          </a:prstGeom>
+          <a:noFill/>
+        </p:spPr>
+        <p:txBody>
+          <a:bodyPr wrap="square" rtlCol="0">
+            <a:spAutoFit/>
+          </a:bodyPr>
+          <a:lstStyle/>
+          <a:p>
+            <a:r>
+              <a:rPr lang="en-GB" sz="2800" dirty="0">
+                <a:solidFill>
+                  <a:schemeClr val="tx1">
+                    <a:lumMod val="85000"/>
+                    <a:lumOff val="15000"/>
+                  </a:schemeClr>
+                </a:solidFill>
+                <a:latin typeface="Open Sans" panose="020B0606030504020204" pitchFamily="34" charset="0"/>
+                <a:ea typeface="Open Sans" panose="020B0606030504020204" pitchFamily="34" charset="0"/>
+                <a:cs typeface="Open Sans" panose="020B0606030504020204" pitchFamily="34" charset="0"/>
+              </a:rPr>
+              <a:t>Data Relay is a series of </a:t>
+            </a:r>
+            <a:r>
+              <a:rPr lang="en-GB" sz="2800" b="1" dirty="0">
+                <a:solidFill>
+                  <a:schemeClr val="tx1">
+                    <a:lumMod val="85000"/>
+                    <a:lumOff val="15000"/>
+                  </a:schemeClr>
+                </a:solidFill>
+                <a:latin typeface="Open Sans" panose="020B0606030504020204" pitchFamily="34" charset="0"/>
+                <a:ea typeface="Open Sans" panose="020B0606030504020204" pitchFamily="34" charset="0"/>
+                <a:cs typeface="Open Sans" panose="020B0606030504020204" pitchFamily="34" charset="0"/>
+              </a:rPr>
+              <a:t>free</a:t>
+            </a:r>
+            <a:r>
+              <a:rPr lang="en-GB" sz="2800" dirty="0">
+                <a:solidFill>
+                  <a:schemeClr val="tx1">
+                    <a:lumMod val="85000"/>
+                    <a:lumOff val="15000"/>
+                  </a:schemeClr>
+                </a:solidFill>
+                <a:latin typeface="Open Sans" panose="020B0606030504020204" pitchFamily="34" charset="0"/>
+                <a:ea typeface="Open Sans" panose="020B0606030504020204" pitchFamily="34" charset="0"/>
+                <a:cs typeface="Open Sans" panose="020B0606030504020204" pitchFamily="34" charset="0"/>
+              </a:rPr>
+              <a:t> Microsoft Data Platform events, coming to a city near you! </a:t>
+            </a:r>
+          </a:p>
+        </p:txBody>
+      </p:sp>
+      <p:sp>
+        <p:nvSpPr>
+          <p:cNvPr id="7" name="TextBox 6">
+            <a:extLst>
+              <a:ext uri="{FF2B5EF4-FFF2-40B4-BE49-F238E27FC236}">
+                <a16:creationId xmlns:a16="http://schemas.microsoft.com/office/drawing/2014/main" id="{FF41F365-9822-BE0E-0BEA-CE12B2CD249D}"/>
+              </a:ext>
+            </a:extLst>
+          </p:cNvPr>
+          <p:cNvSpPr txBox="1"/>
+          <p:nvPr/>
+        </p:nvSpPr>
+        <p:spPr>
+          <a:xfrm>
+            <a:off x="3593987" y="363662"/>
+            <a:ext cx="8182709" cy="769441"/>
+          </a:xfrm>
+          <a:prstGeom prst="rect">
+            <a:avLst/>
+          </a:prstGeom>
+          <a:noFill/>
+        </p:spPr>
+        <p:txBody>
+          <a:bodyPr wrap="square" rtlCol="0">
+            <a:spAutoFit/>
+          </a:bodyPr>
+          <a:lstStyle/>
+          <a:p>
+            <a:r>
+              <a:rPr lang="en-GB" sz="4400" b="1" i="1" dirty="0">
+                <a:solidFill>
+                  <a:schemeClr val="tx1">
+                    <a:lumMod val="85000"/>
+                    <a:lumOff val="15000"/>
+                  </a:schemeClr>
+                </a:solidFill>
+                <a:latin typeface="Open Sans" panose="020B0606030504020204" pitchFamily="34" charset="0"/>
+                <a:ea typeface="Open Sans" panose="020B0606030504020204" pitchFamily="34" charset="0"/>
+                <a:cs typeface="Open Sans" panose="020B0606030504020204" pitchFamily="34" charset="0"/>
+              </a:rPr>
+              <a:t>Save the dates!</a:t>
+            </a:r>
+          </a:p>
+        </p:txBody>
+      </p:sp>
+      <p:sp>
+        <p:nvSpPr>
+          <p:cNvPr id="8" name="TextBox 7">
+            <a:extLst>
+              <a:ext uri="{FF2B5EF4-FFF2-40B4-BE49-F238E27FC236}">
+                <a16:creationId xmlns:a16="http://schemas.microsoft.com/office/drawing/2014/main" id="{438BA240-93B0-590F-857E-D4EB775831BF}"/>
+              </a:ext>
+            </a:extLst>
+          </p:cNvPr>
+          <p:cNvSpPr txBox="1"/>
+          <p:nvPr/>
+        </p:nvSpPr>
+        <p:spPr>
+          <a:xfrm>
+            <a:off x="4547330" y="3000350"/>
+            <a:ext cx="8182709" cy="2677656"/>
+          </a:xfrm>
+          <a:prstGeom prst="rect">
+            <a:avLst/>
+          </a:prstGeom>
+          <a:noFill/>
+        </p:spPr>
+        <p:txBody>
+          <a:bodyPr wrap="square" rtlCol="0">
+            <a:spAutoFit/>
+          </a:bodyPr>
+          <a:lstStyle/>
+          <a:p>
+            <a:pPr marL="342900" indent="-342900">
+              <a:buFont typeface="Arial" panose="020B0604020202020204" pitchFamily="34" charset="0"/>
+              <a:buChar char="•"/>
+            </a:pPr>
+            <a:r>
+              <a:rPr lang="en-GB" sz="2800" dirty="0">
+                <a:solidFill>
+                  <a:schemeClr val="tx1">
+                    <a:lumMod val="85000"/>
+                    <a:lumOff val="15000"/>
+                  </a:schemeClr>
+                </a:solidFill>
+                <a:latin typeface="Open Sans" panose="020B0606030504020204" pitchFamily="34" charset="0"/>
+                <a:ea typeface="Open Sans" panose="020B0606030504020204" pitchFamily="34" charset="0"/>
+                <a:cs typeface="Open Sans" panose="020B0606030504020204" pitchFamily="34" charset="0"/>
+              </a:rPr>
+              <a:t>Newcastle upon Tyne – September 30th</a:t>
+            </a:r>
+          </a:p>
+          <a:p>
+            <a:pPr marL="342900" indent="-342900">
+              <a:buFont typeface="Arial" panose="020B0604020202020204" pitchFamily="34" charset="0"/>
+              <a:buChar char="•"/>
+            </a:pPr>
+            <a:r>
+              <a:rPr lang="en-GB" sz="2800" dirty="0">
+                <a:solidFill>
+                  <a:schemeClr val="tx1">
+                    <a:lumMod val="85000"/>
+                    <a:lumOff val="15000"/>
+                  </a:schemeClr>
+                </a:solidFill>
+                <a:latin typeface="Open Sans" panose="020B0606030504020204" pitchFamily="34" charset="0"/>
+                <a:ea typeface="Open Sans" panose="020B0606030504020204" pitchFamily="34" charset="0"/>
+                <a:cs typeface="Open Sans" panose="020B0606030504020204" pitchFamily="34" charset="0"/>
+              </a:rPr>
+              <a:t>Leeds – October 1st</a:t>
+            </a:r>
+          </a:p>
+          <a:p>
+            <a:pPr marL="342900" indent="-342900">
+              <a:buFont typeface="Arial" panose="020B0604020202020204" pitchFamily="34" charset="0"/>
+              <a:buChar char="•"/>
+            </a:pPr>
+            <a:r>
+              <a:rPr lang="en-GB" sz="2800" dirty="0">
+                <a:solidFill>
+                  <a:schemeClr val="tx1">
+                    <a:lumMod val="85000"/>
+                    <a:lumOff val="15000"/>
+                  </a:schemeClr>
+                </a:solidFill>
+                <a:latin typeface="Open Sans" panose="020B0606030504020204" pitchFamily="34" charset="0"/>
+                <a:ea typeface="Open Sans" panose="020B0606030504020204" pitchFamily="34" charset="0"/>
+                <a:cs typeface="Open Sans" panose="020B0606030504020204" pitchFamily="34" charset="0"/>
+              </a:rPr>
+              <a:t>Birmingham – October 2nd</a:t>
+            </a:r>
+          </a:p>
+          <a:p>
+            <a:pPr marL="342900" indent="-342900">
+              <a:buFont typeface="Arial" panose="020B0604020202020204" pitchFamily="34" charset="0"/>
+              <a:buChar char="•"/>
+            </a:pPr>
+            <a:r>
+              <a:rPr lang="en-GB" sz="2800" dirty="0">
+                <a:solidFill>
+                  <a:schemeClr val="tx1">
+                    <a:lumMod val="85000"/>
+                    <a:lumOff val="15000"/>
+                  </a:schemeClr>
+                </a:solidFill>
+                <a:latin typeface="Open Sans" panose="020B0606030504020204" pitchFamily="34" charset="0"/>
+                <a:ea typeface="Open Sans" panose="020B0606030504020204" pitchFamily="34" charset="0"/>
+                <a:cs typeface="Open Sans" panose="020B0606030504020204" pitchFamily="34" charset="0"/>
+              </a:rPr>
+              <a:t>Bristol – October 3rd</a:t>
+            </a:r>
+          </a:p>
+          <a:p>
+            <a:pPr marL="342900" indent="-342900">
+              <a:buFont typeface="Arial" panose="020B0604020202020204" pitchFamily="34" charset="0"/>
+              <a:buChar char="•"/>
+            </a:pPr>
+            <a:r>
+              <a:rPr lang="en-GB" sz="2800" dirty="0">
+                <a:solidFill>
+                  <a:schemeClr val="tx1">
+                    <a:lumMod val="85000"/>
+                    <a:lumOff val="15000"/>
+                  </a:schemeClr>
+                </a:solidFill>
+                <a:latin typeface="Open Sans" panose="020B0606030504020204" pitchFamily="34" charset="0"/>
+                <a:ea typeface="Open Sans" panose="020B0606030504020204" pitchFamily="34" charset="0"/>
+                <a:cs typeface="Open Sans" panose="020B0606030504020204" pitchFamily="34" charset="0"/>
+              </a:rPr>
+              <a:t>Southampton – October 4th</a:t>
+            </a:r>
+          </a:p>
+          <a:p>
+            <a:pPr marL="342900" indent="-342900">
+              <a:buFont typeface="Arial" panose="020B0604020202020204" pitchFamily="34" charset="0"/>
+              <a:buChar char="•"/>
+            </a:pPr>
+            <a:endParaRPr lang="en-GB" sz="2800" dirty="0">
+              <a:solidFill>
+                <a:schemeClr val="tx1">
+                  <a:lumMod val="85000"/>
+                  <a:lumOff val="15000"/>
+                </a:schemeClr>
+              </a:solidFill>
+              <a:latin typeface="Open Sans" panose="020B0606030504020204" pitchFamily="34" charset="0"/>
+              <a:ea typeface="Open Sans" panose="020B0606030504020204" pitchFamily="34" charset="0"/>
+              <a:cs typeface="Open Sans" panose="020B0606030504020204" pitchFamily="34" charset="0"/>
+            </a:endParaRPr>
+          </a:p>
+        </p:txBody>
+      </p:sp>
+      <p:pic>
+        <p:nvPicPr>
+          <p:cNvPr id="9" name="Picture 8">
+            <a:extLst>
+              <a:ext uri="{FF2B5EF4-FFF2-40B4-BE49-F238E27FC236}">
+                <a16:creationId xmlns:a16="http://schemas.microsoft.com/office/drawing/2014/main" id="{3445AD45-C729-0772-B267-F863A3C0C414}"/>
+              </a:ext>
+            </a:extLst>
+          </p:cNvPr>
+          <p:cNvPicPr>
+            <a:picLocks noChangeAspect="1"/>
+          </p:cNvPicPr>
+          <p:nvPr/>
+        </p:nvPicPr>
+        <p:blipFill>
+          <a:blip r:embed="rId4"/>
+          <a:stretch>
+            <a:fillRect/>
+          </a:stretch>
+        </p:blipFill>
+        <p:spPr>
+          <a:xfrm>
+            <a:off x="9143999" y="381807"/>
+            <a:ext cx="1993525" cy="1996910"/>
+          </a:xfrm>
+          <a:prstGeom prst="rect">
+            <a:avLst/>
+          </a:prstGeom>
+        </p:spPr>
+      </p:pic>
+      <p:sp>
+        <p:nvSpPr>
+          <p:cNvPr id="10" name="TextBox 9">
+            <a:extLst>
+              <a:ext uri="{FF2B5EF4-FFF2-40B4-BE49-F238E27FC236}">
+                <a16:creationId xmlns:a16="http://schemas.microsoft.com/office/drawing/2014/main" id="{B51D795D-B205-ABA6-4530-3932129F2504}"/>
+              </a:ext>
+            </a:extLst>
+          </p:cNvPr>
+          <p:cNvSpPr txBox="1"/>
+          <p:nvPr/>
+        </p:nvSpPr>
+        <p:spPr>
+          <a:xfrm>
+            <a:off x="8630023" y="2419087"/>
+            <a:ext cx="3015276" cy="400110"/>
+          </a:xfrm>
+          <a:prstGeom prst="rect">
+            <a:avLst/>
+          </a:prstGeom>
+          <a:noFill/>
+        </p:spPr>
+        <p:txBody>
+          <a:bodyPr wrap="square" rtlCol="0">
+            <a:spAutoFit/>
+          </a:bodyPr>
+          <a:lstStyle/>
+          <a:p>
+            <a:pPr algn="ctr"/>
+            <a:r>
+              <a:rPr lang="en-GB" sz="2000" dirty="0">
+                <a:solidFill>
+                  <a:schemeClr val="tx1">
+                    <a:lumMod val="85000"/>
+                    <a:lumOff val="15000"/>
+                  </a:schemeClr>
+                </a:solidFill>
+                <a:latin typeface="Open Sans" panose="020B0606030504020204" pitchFamily="34" charset="0"/>
+                <a:ea typeface="Open Sans" panose="020B0606030504020204" pitchFamily="34" charset="0"/>
+                <a:cs typeface="Open Sans" panose="020B0606030504020204" pitchFamily="34" charset="0"/>
+                <a:hlinkClick r:id="rId5"/>
+              </a:rPr>
+              <a:t>https://datarelay.co.uk</a:t>
+            </a:r>
+            <a:r>
+              <a:rPr lang="en-GB" sz="2000" dirty="0">
+                <a:solidFill>
+                  <a:schemeClr val="tx1">
+                    <a:lumMod val="85000"/>
+                    <a:lumOff val="15000"/>
+                  </a:schemeClr>
+                </a:solidFill>
+                <a:latin typeface="Open Sans" panose="020B0606030504020204" pitchFamily="34" charset="0"/>
+                <a:ea typeface="Open Sans" panose="020B0606030504020204" pitchFamily="34" charset="0"/>
+                <a:cs typeface="Open Sans" panose="020B0606030504020204" pitchFamily="34" charset="0"/>
+              </a:rPr>
+              <a:t> </a:t>
+            </a:r>
+          </a:p>
+        </p:txBody>
+      </p:sp>
+    </p:spTree>
+    <p:extLst>
+      <p:ext uri="{BB962C8B-B14F-4D97-AF65-F5344CB8AC3E}">
+        <p14:creationId xmlns:p14="http://schemas.microsoft.com/office/powerpoint/2010/main" val="275162479"/>
+      </p:ext>
+    </p:extLst>
+  </p:cSld>
+  <p:clrMapOvr>
+    <a:masterClrMapping/>
+  </p:clrMapOvr>
+</p:sld>
+</file>
+
+<file path=ppt/slides/slide4.xml><?xml version="1.0" encoding="utf-8"?>
+<p:sld xmlns:a="http://schemas.openxmlformats.org/drawingml/2006/main" xmlns:r="http://schemas.openxmlformats.org/officeDocument/2006/relationships" xmlns:p="http://schemas.openxmlformats.org/presentationml/2006/main">
+  <p:cSld>
+    <p:spTree>
+      <p:nvGrpSpPr>
+        <p:cNvPr id="1" name=""/>
+        <p:cNvGrpSpPr/>
+        <p:nvPr/>
+      </p:nvGrpSpPr>
+      <p:grpSpPr>
+        <a:xfrm>
+          <a:off x="0" y="0"/>
+          <a:ext cx="0" cy="0"/>
+          <a:chOff x="0" y="0"/>
+          <a:chExt cx="0" cy="0"/>
+        </a:xfrm>
+      </p:grpSpPr>
       <p:sp>
         <p:nvSpPr>
           <p:cNvPr id="2" name="Title 1">
@@ -12138,7 +12724,7 @@
 </p:sld>
 </file>
 
-<file path=ppt/slides/slide4.xml><?xml version="1.0" encoding="utf-8"?>
+<file path=ppt/slides/slide5.xml><?xml version="1.0" encoding="utf-8"?>
 <p:sld xmlns:a="http://schemas.openxmlformats.org/drawingml/2006/main" xmlns:r="http://schemas.openxmlformats.org/officeDocument/2006/relationships" xmlns:p="http://schemas.openxmlformats.org/presentationml/2006/main">
   <p:cSld>
     <p:spTree>
@@ -12259,7 +12845,7 @@
 </p:sld>
 </file>
 
-<file path=ppt/slides/slide5.xml><?xml version="1.0" encoding="utf-8"?>
+<file path=ppt/slides/slide6.xml><?xml version="1.0" encoding="utf-8"?>
 <p:sld xmlns:a="http://schemas.openxmlformats.org/drawingml/2006/main" xmlns:r="http://schemas.openxmlformats.org/officeDocument/2006/relationships" xmlns:p="http://schemas.openxmlformats.org/presentationml/2006/main">
   <p:cSld>
     <p:bg>
@@ -12498,7 +13084,7 @@
 </p:sld>
 </file>
 
-<file path=ppt/slides/slide6.xml><?xml version="1.0" encoding="utf-8"?>
+<file path=ppt/slides/slide7.xml><?xml version="1.0" encoding="utf-8"?>
 <p:sld xmlns:a="http://schemas.openxmlformats.org/drawingml/2006/main" xmlns:r="http://schemas.openxmlformats.org/officeDocument/2006/relationships" xmlns:p="http://schemas.openxmlformats.org/presentationml/2006/main" showMasterSp="0">
   <p:cSld>
     <p:bg>
@@ -12654,7 +13240,7 @@
 </p:sld>
 </file>
 
-<file path=ppt/slides/slide7.xml><?xml version="1.0" encoding="utf-8"?>
+<file path=ppt/slides/slide8.xml><?xml version="1.0" encoding="utf-8"?>
 <p:sld xmlns:a="http://schemas.openxmlformats.org/drawingml/2006/main" xmlns:r="http://schemas.openxmlformats.org/officeDocument/2006/relationships" xmlns:p="http://schemas.openxmlformats.org/presentationml/2006/main">
   <p:cSld>
     <p:spTree>
@@ -12758,7 +13344,7 @@
 </p:sld>
 </file>
 
-<file path=ppt/slides/slide8.xml><?xml version="1.0" encoding="utf-8"?>
+<file path=ppt/slides/slide9.xml><?xml version="1.0" encoding="utf-8"?>
 <p:sld xmlns:a="http://schemas.openxmlformats.org/drawingml/2006/main" xmlns:r="http://schemas.openxmlformats.org/officeDocument/2006/relationships" xmlns:p="http://schemas.openxmlformats.org/presentationml/2006/main">
   <p:cSld>
     <p:spTree>
@@ -13212,135 +13798,6 @@
     <p:extLst>
       <p:ext uri="{BB962C8B-B14F-4D97-AF65-F5344CB8AC3E}">
         <p14:creationId xmlns:p14="http://schemas.microsoft.com/office/powerpoint/2010/main" val="2552751799"/>
-      </p:ext>
-    </p:extLst>
-  </p:cSld>
-  <p:clrMapOvr>
-    <a:masterClrMapping/>
-  </p:clrMapOvr>
-</p:sld>
-</file>
-
-<file path=ppt/slides/slide9.xml><?xml version="1.0" encoding="utf-8"?>
-<p:sld xmlns:a="http://schemas.openxmlformats.org/drawingml/2006/main" xmlns:r="http://schemas.openxmlformats.org/officeDocument/2006/relationships" xmlns:p="http://schemas.openxmlformats.org/presentationml/2006/main">
-  <p:cSld>
-    <p:spTree>
-      <p:nvGrpSpPr>
-        <p:cNvPr id="1" name=""/>
-        <p:cNvGrpSpPr/>
-        <p:nvPr/>
-      </p:nvGrpSpPr>
-      <p:grpSpPr>
-        <a:xfrm>
-          <a:off x="0" y="0"/>
-          <a:ext cx="0" cy="0"/>
-          <a:chOff x="0" y="0"/>
-          <a:chExt cx="0" cy="0"/>
-        </a:xfrm>
-      </p:grpSpPr>
-      <p:sp>
-        <p:nvSpPr>
-          <p:cNvPr id="2" name="Title 1">
-            <a:extLst>
-              <a:ext uri="{FF2B5EF4-FFF2-40B4-BE49-F238E27FC236}">
-                <a16:creationId xmlns:a16="http://schemas.microsoft.com/office/drawing/2014/main" id="{5F363C9A-E2EA-EA57-35C8-E4516C9C5BF3}"/>
-              </a:ext>
-            </a:extLst>
-          </p:cNvPr>
-          <p:cNvSpPr>
-            <a:spLocks noGrp="1"/>
-          </p:cNvSpPr>
-          <p:nvPr>
-            <p:ph type="title"/>
-          </p:nvPr>
-        </p:nvSpPr>
-        <p:spPr/>
-        <p:txBody>
-          <a:bodyPr/>
-          <a:lstStyle/>
-          <a:p>
-            <a:r>
-              <a:rPr lang="en-US" dirty="0"/>
-              <a:t>Partition Functions (2)</a:t>
-            </a:r>
-          </a:p>
-        </p:txBody>
-      </p:sp>
-      <p:sp>
-        <p:nvSpPr>
-          <p:cNvPr id="3" name="Content Placeholder 2">
-            <a:extLst>
-              <a:ext uri="{FF2B5EF4-FFF2-40B4-BE49-F238E27FC236}">
-                <a16:creationId xmlns:a16="http://schemas.microsoft.com/office/drawing/2014/main" id="{D5780808-EDFC-D563-CB25-280150662DEF}"/>
-              </a:ext>
-            </a:extLst>
-          </p:cNvPr>
-          <p:cNvSpPr>
-            <a:spLocks noGrp="1"/>
-          </p:cNvSpPr>
-          <p:nvPr>
-            <p:ph idx="1"/>
-          </p:nvPr>
-        </p:nvSpPr>
-        <p:spPr/>
-        <p:txBody>
-          <a:bodyPr/>
-          <a:lstStyle/>
-          <a:p>
-            <a:r>
-              <a:rPr lang="en-US" dirty="0"/>
-              <a:t>Partition Functions are not easy to alter</a:t>
-            </a:r>
-          </a:p>
-          <a:p>
-            <a:r>
-              <a:rPr lang="en-US" dirty="0"/>
-              <a:t>A partition for anything to the left of your initial boundary will be created.</a:t>
-            </a:r>
-          </a:p>
-          <a:p>
-            <a:r>
-              <a:rPr lang="en-US" dirty="0"/>
-              <a:t>Think about the lifecycle of your data and the partitioning. </a:t>
-            </a:r>
-          </a:p>
-          <a:p>
-            <a:pPr lvl="1"/>
-            <a:r>
-              <a:rPr lang="en-US" dirty="0"/>
-              <a:t>Create more partitions for the future, maybe 3-5 years?</a:t>
-            </a:r>
-          </a:p>
-          <a:p>
-            <a:pPr lvl="1"/>
-            <a:r>
-              <a:rPr lang="en-US" dirty="0"/>
-              <a:t>Create them programmatically for really long periods </a:t>
-            </a:r>
-          </a:p>
-          <a:p>
-            <a:r>
-              <a:rPr lang="en-US" dirty="0"/>
-              <a:t>Can be applied to more that one table.</a:t>
-            </a:r>
-          </a:p>
-          <a:p>
-            <a:pPr lvl="1"/>
-            <a:r>
-              <a:rPr lang="en-US" dirty="0"/>
-              <a:t>Partition HR and Finance data on the same boundaries?</a:t>
-            </a:r>
-          </a:p>
-          <a:p>
-            <a:pPr lvl="1"/>
-            <a:endParaRPr lang="en-US" dirty="0"/>
-          </a:p>
-        </p:txBody>
-      </p:sp>
-    </p:spTree>
-    <p:extLst>
-      <p:ext uri="{BB962C8B-B14F-4D97-AF65-F5344CB8AC3E}">
-        <p14:creationId xmlns:p14="http://schemas.microsoft.com/office/powerpoint/2010/main" val="3316607413"/>
       </p:ext>
     </p:extLst>
   </p:cSld>

</xml_diff>